<commit_message>
Final update to pptx.
</commit_message>
<xml_diff>
--- a/T-Mobile one.pptx
+++ b/T-Mobile one.pptx
@@ -6,12 +6,11 @@
   </p:sldMasterIdLst>
   <p:sldIdLst>
     <p:sldId id="256" r:id="rId2"/>
-    <p:sldId id="257" r:id="rId3"/>
-    <p:sldId id="258" r:id="rId4"/>
-    <p:sldId id="259" r:id="rId5"/>
-    <p:sldId id="260" r:id="rId6"/>
-    <p:sldId id="261" r:id="rId7"/>
-    <p:sldId id="262" r:id="rId8"/>
+    <p:sldId id="258" r:id="rId3"/>
+    <p:sldId id="259" r:id="rId4"/>
+    <p:sldId id="260" r:id="rId5"/>
+    <p:sldId id="261" r:id="rId6"/>
+    <p:sldId id="262" r:id="rId7"/>
   </p:sldIdLst>
   <p:sldSz cx="12192000" cy="6858000"/>
   <p:notesSz cx="6858000" cy="9144000"/>
@@ -1011,42 +1010,6 @@
         </a:p>
       </dgm:t>
     </dgm:pt>
-    <dgm:pt modelId="{75EB6D27-7321-462D-A601-B0FD3615EA9D}">
-      <dgm:prSet phldrT="[Text]"/>
-      <dgm:spPr/>
-      <dgm:t>
-        <a:bodyPr/>
-        <a:lstStyle/>
-        <a:p>
-          <a:r>
-            <a:rPr lang="en-US" dirty="0"/>
-            <a:t>Everything gets passed to Azure processing</a:t>
-          </a:r>
-        </a:p>
-      </dgm:t>
-    </dgm:pt>
-    <dgm:pt modelId="{876B059B-82BC-4C73-A2B0-ADF156FC233C}" type="parTrans" cxnId="{84E81599-2077-4D49-9547-CB43566A9662}">
-      <dgm:prSet/>
-      <dgm:spPr/>
-      <dgm:t>
-        <a:bodyPr/>
-        <a:lstStyle/>
-        <a:p>
-          <a:endParaRPr lang="en-US"/>
-        </a:p>
-      </dgm:t>
-    </dgm:pt>
-    <dgm:pt modelId="{A773B523-592D-4879-916B-899DD7F9623A}" type="sibTrans" cxnId="{84E81599-2077-4D49-9547-CB43566A9662}">
-      <dgm:prSet/>
-      <dgm:spPr/>
-      <dgm:t>
-        <a:bodyPr/>
-        <a:lstStyle/>
-        <a:p>
-          <a:endParaRPr lang="en-US"/>
-        </a:p>
-      </dgm:t>
-    </dgm:pt>
     <dgm:pt modelId="{8BA89858-B5AB-4CEA-AA50-053A9DA9AB72}">
       <dgm:prSet phldrT="[Text]"/>
       <dgm:spPr/>
@@ -1093,7 +1056,7 @@
       <dgm:spPr/>
     </dgm:pt>
     <dgm:pt modelId="{204D47EB-DAD7-4D1D-986A-BFEBBA00268B}" type="pres">
-      <dgm:prSet presAssocID="{8F1D1A63-2451-43C5-8DE1-79B93AF85F1B}" presName="parTxOnly" presStyleLbl="node1" presStyleIdx="0" presStyleCnt="6" custScaleX="71817">
+      <dgm:prSet presAssocID="{8F1D1A63-2451-43C5-8DE1-79B93AF85F1B}" presName="parTxOnly" presStyleLbl="node1" presStyleIdx="0" presStyleCnt="5" custScaleX="71817">
         <dgm:presLayoutVars>
           <dgm:bulletEnabled val="1"/>
         </dgm:presLayoutVars>
@@ -1105,7 +1068,7 @@
       <dgm:spPr/>
     </dgm:pt>
     <dgm:pt modelId="{3974F843-86FF-49D3-B20F-5A6C79274B69}" type="pres">
-      <dgm:prSet presAssocID="{7B792048-7869-40A8-8E9A-648648E9A32D}" presName="parTxOnly" presStyleLbl="node1" presStyleIdx="1" presStyleCnt="6">
+      <dgm:prSet presAssocID="{7B792048-7869-40A8-8E9A-648648E9A32D}" presName="parTxOnly" presStyleLbl="node1" presStyleIdx="1" presStyleCnt="5">
         <dgm:presLayoutVars>
           <dgm:bulletEnabled val="1"/>
         </dgm:presLayoutVars>
@@ -1117,7 +1080,7 @@
       <dgm:spPr/>
     </dgm:pt>
     <dgm:pt modelId="{EA97EFFC-4523-4543-BAED-EBBF821112DC}" type="pres">
-      <dgm:prSet presAssocID="{28409DDE-56D7-4DF8-96A0-39896107F18D}" presName="parTxOnly" presStyleLbl="node1" presStyleIdx="2" presStyleCnt="6">
+      <dgm:prSet presAssocID="{28409DDE-56D7-4DF8-96A0-39896107F18D}" presName="parTxOnly" presStyleLbl="node1" presStyleIdx="2" presStyleCnt="5">
         <dgm:presLayoutVars>
           <dgm:bulletEnabled val="1"/>
         </dgm:presLayoutVars>
@@ -1129,7 +1092,7 @@
       <dgm:spPr/>
     </dgm:pt>
     <dgm:pt modelId="{C5F9BE89-3701-4C23-8426-1B32E6D537A5}" type="pres">
-      <dgm:prSet presAssocID="{17730755-051D-4F98-BAC7-A73EBC488D30}" presName="parTxOnly" presStyleLbl="node1" presStyleIdx="3" presStyleCnt="6">
+      <dgm:prSet presAssocID="{17730755-051D-4F98-BAC7-A73EBC488D30}" presName="parTxOnly" presStyleLbl="node1" presStyleIdx="3" presStyleCnt="5">
         <dgm:presLayoutVars>
           <dgm:bulletEnabled val="1"/>
         </dgm:presLayoutVars>
@@ -1140,20 +1103,8 @@
       <dgm:prSet presAssocID="{4132D762-52E8-4D4A-8699-19108B98196D}" presName="parSpace" presStyleCnt="0"/>
       <dgm:spPr/>
     </dgm:pt>
-    <dgm:pt modelId="{9E8A0717-680D-42BD-B904-3FC0A9BA9F09}" type="pres">
-      <dgm:prSet presAssocID="{75EB6D27-7321-462D-A601-B0FD3615EA9D}" presName="parTxOnly" presStyleLbl="node1" presStyleIdx="4" presStyleCnt="6">
-        <dgm:presLayoutVars>
-          <dgm:bulletEnabled val="1"/>
-        </dgm:presLayoutVars>
-      </dgm:prSet>
-      <dgm:spPr/>
-    </dgm:pt>
-    <dgm:pt modelId="{E39F4F0C-1F0B-4EA9-823C-2E8880A42C18}" type="pres">
-      <dgm:prSet presAssocID="{A773B523-592D-4879-916B-899DD7F9623A}" presName="parSpace" presStyleCnt="0"/>
-      <dgm:spPr/>
-    </dgm:pt>
     <dgm:pt modelId="{9D573512-732A-4EA1-B1D0-069DA97D2130}" type="pres">
-      <dgm:prSet presAssocID="{8BA89858-B5AB-4CEA-AA50-053A9DA9AB72}" presName="parTxOnly" presStyleLbl="node1" presStyleIdx="5" presStyleCnt="6">
+      <dgm:prSet presAssocID="{8BA89858-B5AB-4CEA-AA50-053A9DA9AB72}" presName="parTxOnly" presStyleLbl="node1" presStyleIdx="4" presStyleCnt="5">
         <dgm:presLayoutVars>
           <dgm:bulletEnabled val="1"/>
         </dgm:presLayoutVars>
@@ -1162,19 +1113,17 @@
     </dgm:pt>
   </dgm:ptLst>
   <dgm:cxnLst>
-    <dgm:cxn modelId="{FB1EDF1D-494E-4EFF-9D92-28426E216944}" srcId="{0B2BEF1A-98B4-48E9-A744-AD8D5470E975}" destId="{8BA89858-B5AB-4CEA-AA50-053A9DA9AB72}" srcOrd="5" destOrd="0" parTransId="{58F72A3E-E28B-48A7-B008-46FB3A2FD95E}" sibTransId="{13E81A0D-5928-4077-8FC8-CF0ECEED3D85}"/>
+    <dgm:cxn modelId="{FB1EDF1D-494E-4EFF-9D92-28426E216944}" srcId="{0B2BEF1A-98B4-48E9-A744-AD8D5470E975}" destId="{8BA89858-B5AB-4CEA-AA50-053A9DA9AB72}" srcOrd="4" destOrd="0" parTransId="{58F72A3E-E28B-48A7-B008-46FB3A2FD95E}" sibTransId="{13E81A0D-5928-4077-8FC8-CF0ECEED3D85}"/>
     <dgm:cxn modelId="{9D751D23-BADC-4062-9E46-4F4E039D0779}" type="presOf" srcId="{8F1D1A63-2451-43C5-8DE1-79B93AF85F1B}" destId="{204D47EB-DAD7-4D1D-986A-BFEBBA00268B}" srcOrd="0" destOrd="0" presId="urn:microsoft.com/office/officeart/2005/8/layout/hChevron3"/>
     <dgm:cxn modelId="{1A123C29-9D21-4FB7-941C-E0B0CA8317EE}" type="presOf" srcId="{7B792048-7869-40A8-8E9A-648648E9A32D}" destId="{3974F843-86FF-49D3-B20F-5A6C79274B69}" srcOrd="0" destOrd="0" presId="urn:microsoft.com/office/officeart/2005/8/layout/hChevron3"/>
     <dgm:cxn modelId="{2D030B32-81F6-44FC-AD6F-8CE149AD1EB1}" srcId="{0B2BEF1A-98B4-48E9-A744-AD8D5470E975}" destId="{7B792048-7869-40A8-8E9A-648648E9A32D}" srcOrd="1" destOrd="0" parTransId="{4DEA15E0-5AFC-4D05-BFE8-0CAFA216BF33}" sibTransId="{97E2ABFA-2E5B-4949-84BA-A79041A04E91}"/>
     <dgm:cxn modelId="{6245B568-939B-45C5-BA27-43C032E9725F}" type="presOf" srcId="{0B2BEF1A-98B4-48E9-A744-AD8D5470E975}" destId="{B5AB793D-6DEF-405A-9239-8C145958F64F}" srcOrd="0" destOrd="0" presId="urn:microsoft.com/office/officeart/2005/8/layout/hChevron3"/>
     <dgm:cxn modelId="{6930FC6A-1B21-4244-AEA4-8F125D24359B}" srcId="{0B2BEF1A-98B4-48E9-A744-AD8D5470E975}" destId="{17730755-051D-4F98-BAC7-A73EBC488D30}" srcOrd="3" destOrd="0" parTransId="{87DC4CCD-4478-4458-9708-0A0E9F49D4A8}" sibTransId="{4132D762-52E8-4D4A-8699-19108B98196D}"/>
     <dgm:cxn modelId="{CBC6AA52-C31A-433A-827A-8079F41EB6C9}" type="presOf" srcId="{8BA89858-B5AB-4CEA-AA50-053A9DA9AB72}" destId="{9D573512-732A-4EA1-B1D0-069DA97D2130}" srcOrd="0" destOrd="0" presId="urn:microsoft.com/office/officeart/2005/8/layout/hChevron3"/>
-    <dgm:cxn modelId="{84E81599-2077-4D49-9547-CB43566A9662}" srcId="{0B2BEF1A-98B4-48E9-A744-AD8D5470E975}" destId="{75EB6D27-7321-462D-A601-B0FD3615EA9D}" srcOrd="4" destOrd="0" parTransId="{876B059B-82BC-4C73-A2B0-ADF156FC233C}" sibTransId="{A773B523-592D-4879-916B-899DD7F9623A}"/>
     <dgm:cxn modelId="{E9D424A7-9F27-4629-8DF2-6813E99A1329}" srcId="{0B2BEF1A-98B4-48E9-A744-AD8D5470E975}" destId="{8F1D1A63-2451-43C5-8DE1-79B93AF85F1B}" srcOrd="0" destOrd="0" parTransId="{41E3FEBF-9ECB-4CEE-A4E7-B3C189811949}" sibTransId="{1816703C-913C-465E-8EE6-37CA9AE1D993}"/>
     <dgm:cxn modelId="{297FB9B1-4B3F-49FD-B8C2-F108523D63D8}" type="presOf" srcId="{17730755-051D-4F98-BAC7-A73EBC488D30}" destId="{C5F9BE89-3701-4C23-8426-1B32E6D537A5}" srcOrd="0" destOrd="0" presId="urn:microsoft.com/office/officeart/2005/8/layout/hChevron3"/>
     <dgm:cxn modelId="{F883D6BC-476A-4088-93C6-EA1047531247}" type="presOf" srcId="{28409DDE-56D7-4DF8-96A0-39896107F18D}" destId="{EA97EFFC-4523-4543-BAED-EBBF821112DC}" srcOrd="0" destOrd="0" presId="urn:microsoft.com/office/officeart/2005/8/layout/hChevron3"/>
     <dgm:cxn modelId="{0D0D99C7-B269-495F-9AA8-4C5FA4F53044}" srcId="{0B2BEF1A-98B4-48E9-A744-AD8D5470E975}" destId="{28409DDE-56D7-4DF8-96A0-39896107F18D}" srcOrd="2" destOrd="0" parTransId="{4D41418D-670F-4496-AFD8-36CBBF252B78}" sibTransId="{3280141F-D4B1-4BF9-B450-5FA40909F160}"/>
-    <dgm:cxn modelId="{A22855D6-1FCA-4A7A-B30B-3F820713B8C9}" type="presOf" srcId="{75EB6D27-7321-462D-A601-B0FD3615EA9D}" destId="{9E8A0717-680D-42BD-B904-3FC0A9BA9F09}" srcOrd="0" destOrd="0" presId="urn:microsoft.com/office/officeart/2005/8/layout/hChevron3"/>
     <dgm:cxn modelId="{9B73C8E8-CCC6-49D9-BD94-5A5CFE866BC3}" type="presParOf" srcId="{B5AB793D-6DEF-405A-9239-8C145958F64F}" destId="{204D47EB-DAD7-4D1D-986A-BFEBBA00268B}" srcOrd="0" destOrd="0" presId="urn:microsoft.com/office/officeart/2005/8/layout/hChevron3"/>
     <dgm:cxn modelId="{E4F7D2E5-E56B-4D86-8FD2-5DEDB9EC059C}" type="presParOf" srcId="{B5AB793D-6DEF-405A-9239-8C145958F64F}" destId="{81A29B45-177E-40B3-B72A-EC853764D8DC}" srcOrd="1" destOrd="0" presId="urn:microsoft.com/office/officeart/2005/8/layout/hChevron3"/>
     <dgm:cxn modelId="{A0F6E089-F95A-4E91-8E0E-882DB116488A}" type="presParOf" srcId="{B5AB793D-6DEF-405A-9239-8C145958F64F}" destId="{3974F843-86FF-49D3-B20F-5A6C79274B69}" srcOrd="2" destOrd="0" presId="urn:microsoft.com/office/officeart/2005/8/layout/hChevron3"/>
@@ -1183,9 +1132,7 @@
     <dgm:cxn modelId="{0D4BB9D9-29AE-44F9-8B24-7738B6C585BD}" type="presParOf" srcId="{B5AB793D-6DEF-405A-9239-8C145958F64F}" destId="{84A48E4E-07B1-40B8-A4B7-4E18939DA123}" srcOrd="5" destOrd="0" presId="urn:microsoft.com/office/officeart/2005/8/layout/hChevron3"/>
     <dgm:cxn modelId="{A5A3BA3C-9DFD-4596-9F7D-7F29F8ECE833}" type="presParOf" srcId="{B5AB793D-6DEF-405A-9239-8C145958F64F}" destId="{C5F9BE89-3701-4C23-8426-1B32E6D537A5}" srcOrd="6" destOrd="0" presId="urn:microsoft.com/office/officeart/2005/8/layout/hChevron3"/>
     <dgm:cxn modelId="{08943042-5570-4FE5-AD96-9848E4AA5101}" type="presParOf" srcId="{B5AB793D-6DEF-405A-9239-8C145958F64F}" destId="{6D8E287B-5252-4CB0-8C13-C65DC4C224CE}" srcOrd="7" destOrd="0" presId="urn:microsoft.com/office/officeart/2005/8/layout/hChevron3"/>
-    <dgm:cxn modelId="{8D081F08-73E4-4AEC-B059-7C324D52179D}" type="presParOf" srcId="{B5AB793D-6DEF-405A-9239-8C145958F64F}" destId="{9E8A0717-680D-42BD-B904-3FC0A9BA9F09}" srcOrd="8" destOrd="0" presId="urn:microsoft.com/office/officeart/2005/8/layout/hChevron3"/>
-    <dgm:cxn modelId="{01368FDD-B639-49E9-AA51-6F2C1E34B419}" type="presParOf" srcId="{B5AB793D-6DEF-405A-9239-8C145958F64F}" destId="{E39F4F0C-1F0B-4EA9-823C-2E8880A42C18}" srcOrd="9" destOrd="0" presId="urn:microsoft.com/office/officeart/2005/8/layout/hChevron3"/>
-    <dgm:cxn modelId="{23DA5EA8-934D-4830-9341-ACC690A7910B}" type="presParOf" srcId="{B5AB793D-6DEF-405A-9239-8C145958F64F}" destId="{9D573512-732A-4EA1-B1D0-069DA97D2130}" srcOrd="10" destOrd="0" presId="urn:microsoft.com/office/officeart/2005/8/layout/hChevron3"/>
+    <dgm:cxn modelId="{23DA5EA8-934D-4830-9341-ACC690A7910B}" type="presParOf" srcId="{B5AB793D-6DEF-405A-9239-8C145958F64F}" destId="{9D573512-732A-4EA1-B1D0-069DA97D2130}" srcOrd="8" destOrd="0" presId="urn:microsoft.com/office/officeart/2005/8/layout/hChevron3"/>
   </dgm:cxnLst>
   <dgm:bg/>
   <dgm:whole/>
@@ -1212,8 +1159,8 @@
       </dsp:nvSpPr>
       <dsp:spPr>
         <a:xfrm>
-          <a:off x="830" y="1553557"/>
-          <a:ext cx="1646760" cy="917197"/>
+          <a:off x="7172" y="1460569"/>
+          <a:ext cx="1980665" cy="1103173"/>
         </a:xfrm>
         <a:prstGeom prst="homePlate">
           <a:avLst/>
@@ -1254,12 +1201,12 @@
         </a:fontRef>
       </dsp:style>
       <dsp:txBody>
-        <a:bodyPr spcFirstLastPara="0" vert="horz" wrap="square" lIns="69342" tIns="34671" rIns="17336" bIns="34671" numCol="1" spcCol="1270" anchor="ctr" anchorCtr="0">
+        <a:bodyPr spcFirstLastPara="0" vert="horz" wrap="square" lIns="85344" tIns="42672" rIns="21336" bIns="42672" numCol="1" spcCol="1270" anchor="ctr" anchorCtr="0">
           <a:noAutofit/>
         </a:bodyPr>
         <a:lstStyle/>
         <a:p>
-          <a:pPr marL="0" lvl="0" indent="0" algn="ctr" defTabSz="577850">
+          <a:pPr marL="0" lvl="0" indent="0" algn="ctr" defTabSz="711200">
             <a:lnSpc>
               <a:spcPct val="90000"/>
             </a:lnSpc>
@@ -1272,14 +1219,14 @@
             <a:buNone/>
           </a:pPr>
           <a:r>
-            <a:rPr lang="en-US" sz="1300" kern="1200" dirty="0"/>
+            <a:rPr lang="en-US" sz="1600" kern="1200" dirty="0"/>
             <a:t>Customer calls             T-Mobile</a:t>
           </a:r>
         </a:p>
       </dsp:txBody>
       <dsp:txXfrm>
-        <a:off x="830" y="1553557"/>
-        <a:ext cx="1417461" cy="917197"/>
+        <a:off x="7172" y="1460569"/>
+        <a:ext cx="1704872" cy="1103173"/>
       </dsp:txXfrm>
     </dsp:sp>
     <dsp:sp modelId="{3974F843-86FF-49D3-B20F-5A6C79274B69}">
@@ -1289,8 +1236,8 @@
       </dsp:nvSpPr>
       <dsp:spPr>
         <a:xfrm>
-          <a:off x="1188991" y="1553557"/>
-          <a:ext cx="2292994" cy="917197"/>
+          <a:off x="1436251" y="1460569"/>
+          <a:ext cx="2757933" cy="1103173"/>
         </a:xfrm>
         <a:prstGeom prst="chevron">
           <a:avLst/>
@@ -1331,12 +1278,12 @@
         </a:fontRef>
       </dsp:style>
       <dsp:txBody>
-        <a:bodyPr spcFirstLastPara="0" vert="horz" wrap="square" lIns="52007" tIns="34671" rIns="17336" bIns="34671" numCol="1" spcCol="1270" anchor="ctr" anchorCtr="0">
+        <a:bodyPr spcFirstLastPara="0" vert="horz" wrap="square" lIns="64008" tIns="42672" rIns="21336" bIns="42672" numCol="1" spcCol="1270" anchor="ctr" anchorCtr="0">
           <a:noAutofit/>
         </a:bodyPr>
         <a:lstStyle/>
         <a:p>
-          <a:pPr marL="0" lvl="0" indent="0" algn="ctr" defTabSz="577850">
+          <a:pPr marL="0" lvl="0" indent="0" algn="ctr" defTabSz="711200">
             <a:lnSpc>
               <a:spcPct val="90000"/>
             </a:lnSpc>
@@ -1349,14 +1296,14 @@
             <a:buNone/>
           </a:pPr>
           <a:r>
-            <a:rPr lang="en-US" sz="1300" kern="1200" dirty="0"/>
+            <a:rPr lang="en-US" sz="1600" kern="1200" dirty="0"/>
             <a:t>T-Mobile one answers</a:t>
           </a:r>
         </a:p>
       </dsp:txBody>
       <dsp:txXfrm>
-        <a:off x="1647590" y="1553557"/>
-        <a:ext cx="1375797" cy="917197"/>
+        <a:off x="1987838" y="1460569"/>
+        <a:ext cx="1654760" cy="1103173"/>
       </dsp:txXfrm>
     </dsp:sp>
     <dsp:sp modelId="{EA97EFFC-4523-4543-BAED-EBBF821112DC}">
@@ -1366,8 +1313,8 @@
       </dsp:nvSpPr>
       <dsp:spPr>
         <a:xfrm>
-          <a:off x="3023387" y="1553557"/>
-          <a:ext cx="2292994" cy="917197"/>
+          <a:off x="3642598" y="1460569"/>
+          <a:ext cx="2757933" cy="1103173"/>
         </a:xfrm>
         <a:prstGeom prst="chevron">
           <a:avLst/>
@@ -1408,12 +1355,12 @@
         </a:fontRef>
       </dsp:style>
       <dsp:txBody>
-        <a:bodyPr spcFirstLastPara="0" vert="horz" wrap="square" lIns="52007" tIns="34671" rIns="17336" bIns="34671" numCol="1" spcCol="1270" anchor="ctr" anchorCtr="0">
+        <a:bodyPr spcFirstLastPara="0" vert="horz" wrap="square" lIns="64008" tIns="42672" rIns="21336" bIns="42672" numCol="1" spcCol="1270" anchor="ctr" anchorCtr="0">
           <a:noAutofit/>
         </a:bodyPr>
         <a:lstStyle/>
         <a:p>
-          <a:pPr marL="0" lvl="0" indent="0" algn="ctr" defTabSz="577850">
+          <a:pPr marL="0" lvl="0" indent="0" algn="ctr" defTabSz="711200">
             <a:lnSpc>
               <a:spcPct val="90000"/>
             </a:lnSpc>
@@ -1426,14 +1373,14 @@
             <a:buNone/>
           </a:pPr>
           <a:r>
-            <a:rPr lang="en-US" sz="1300" kern="1200" dirty="0"/>
+            <a:rPr lang="en-US" sz="1600" kern="1200" dirty="0"/>
             <a:t>Twilio gets data on customer</a:t>
           </a:r>
         </a:p>
       </dsp:txBody>
       <dsp:txXfrm>
-        <a:off x="3481986" y="1553557"/>
-        <a:ext cx="1375797" cy="917197"/>
+        <a:off x="4194185" y="1460569"/>
+        <a:ext cx="1654760" cy="1103173"/>
       </dsp:txXfrm>
     </dsp:sp>
     <dsp:sp modelId="{C5F9BE89-3701-4C23-8426-1B32E6D537A5}">
@@ -1443,8 +1390,8 @@
       </dsp:nvSpPr>
       <dsp:spPr>
         <a:xfrm>
-          <a:off x="4857783" y="1553557"/>
-          <a:ext cx="2292994" cy="917197"/>
+          <a:off x="5848945" y="1460569"/>
+          <a:ext cx="2757933" cy="1103173"/>
         </a:xfrm>
         <a:prstGeom prst="chevron">
           <a:avLst/>
@@ -1485,12 +1432,12 @@
         </a:fontRef>
       </dsp:style>
       <dsp:txBody>
-        <a:bodyPr spcFirstLastPara="0" vert="horz" wrap="square" lIns="52007" tIns="34671" rIns="17336" bIns="34671" numCol="1" spcCol="1270" anchor="ctr" anchorCtr="0">
+        <a:bodyPr spcFirstLastPara="0" vert="horz" wrap="square" lIns="64008" tIns="42672" rIns="21336" bIns="42672" numCol="1" spcCol="1270" anchor="ctr" anchorCtr="0">
           <a:noAutofit/>
         </a:bodyPr>
         <a:lstStyle/>
         <a:p>
-          <a:pPr marL="0" lvl="0" indent="0" algn="ctr" defTabSz="577850">
+          <a:pPr marL="0" lvl="0" indent="0" algn="ctr" defTabSz="711200">
             <a:lnSpc>
               <a:spcPct val="90000"/>
             </a:lnSpc>
@@ -1503,25 +1450,25 @@
             <a:buNone/>
           </a:pPr>
           <a:r>
-            <a:rPr lang="en-US" sz="1300" kern="1200" dirty="0"/>
+            <a:rPr lang="en-US" sz="1600" kern="1200" dirty="0"/>
             <a:t>Forwarded to Dialogue Flow</a:t>
           </a:r>
         </a:p>
       </dsp:txBody>
       <dsp:txXfrm>
-        <a:off x="5316382" y="1553557"/>
-        <a:ext cx="1375797" cy="917197"/>
+        <a:off x="6400532" y="1460569"/>
+        <a:ext cx="1654760" cy="1103173"/>
       </dsp:txXfrm>
     </dsp:sp>
-    <dsp:sp modelId="{9E8A0717-680D-42BD-B904-3FC0A9BA9F09}">
+    <dsp:sp modelId="{9D573512-732A-4EA1-B1D0-069DA97D2130}">
       <dsp:nvSpPr>
         <dsp:cNvPr id="0" name=""/>
         <dsp:cNvSpPr/>
       </dsp:nvSpPr>
       <dsp:spPr>
         <a:xfrm>
-          <a:off x="6692179" y="1553557"/>
-          <a:ext cx="2292994" cy="917197"/>
+          <a:off x="8055293" y="1460569"/>
+          <a:ext cx="2757933" cy="1103173"/>
         </a:xfrm>
         <a:prstGeom prst="chevron">
           <a:avLst/>
@@ -1562,12 +1509,12 @@
         </a:fontRef>
       </dsp:style>
       <dsp:txBody>
-        <a:bodyPr spcFirstLastPara="0" vert="horz" wrap="square" lIns="52007" tIns="34671" rIns="17336" bIns="34671" numCol="1" spcCol="1270" anchor="ctr" anchorCtr="0">
+        <a:bodyPr spcFirstLastPara="0" vert="horz" wrap="square" lIns="64008" tIns="42672" rIns="21336" bIns="42672" numCol="1" spcCol="1270" anchor="ctr" anchorCtr="0">
           <a:noAutofit/>
         </a:bodyPr>
         <a:lstStyle/>
         <a:p>
-          <a:pPr marL="0" lvl="0" indent="0" algn="ctr" defTabSz="577850">
+          <a:pPr marL="0" lvl="0" indent="0" algn="ctr" defTabSz="711200">
             <a:lnSpc>
               <a:spcPct val="90000"/>
             </a:lnSpc>
@@ -1580,91 +1527,14 @@
             <a:buNone/>
           </a:pPr>
           <a:r>
-            <a:rPr lang="en-US" sz="1300" kern="1200" dirty="0"/>
-            <a:t>Everything gets passed to Azure processing</a:t>
-          </a:r>
-        </a:p>
-      </dsp:txBody>
-      <dsp:txXfrm>
-        <a:off x="7150778" y="1553557"/>
-        <a:ext cx="1375797" cy="917197"/>
-      </dsp:txXfrm>
-    </dsp:sp>
-    <dsp:sp modelId="{9D573512-732A-4EA1-B1D0-069DA97D2130}">
-      <dsp:nvSpPr>
-        <dsp:cNvPr id="0" name=""/>
-        <dsp:cNvSpPr/>
-      </dsp:nvSpPr>
-      <dsp:spPr>
-        <a:xfrm>
-          <a:off x="8526575" y="1553557"/>
-          <a:ext cx="2292994" cy="917197"/>
-        </a:xfrm>
-        <a:prstGeom prst="chevron">
-          <a:avLst/>
-        </a:prstGeom>
-        <a:solidFill>
-          <a:schemeClr val="accent1">
-            <a:hueOff val="0"/>
-            <a:satOff val="0"/>
-            <a:lumOff val="0"/>
-            <a:alphaOff val="0"/>
-          </a:schemeClr>
-        </a:solidFill>
-        <a:ln w="12700" cap="flat" cmpd="sng" algn="ctr">
-          <a:solidFill>
-            <a:schemeClr val="lt1">
-              <a:hueOff val="0"/>
-              <a:satOff val="0"/>
-              <a:lumOff val="0"/>
-              <a:alphaOff val="0"/>
-            </a:schemeClr>
-          </a:solidFill>
-          <a:prstDash val="solid"/>
-        </a:ln>
-        <a:effectLst/>
-      </dsp:spPr>
-      <dsp:style>
-        <a:lnRef idx="2">
-          <a:scrgbClr r="0" g="0" b="0"/>
-        </a:lnRef>
-        <a:fillRef idx="1">
-          <a:scrgbClr r="0" g="0" b="0"/>
-        </a:fillRef>
-        <a:effectRef idx="0">
-          <a:scrgbClr r="0" g="0" b="0"/>
-        </a:effectRef>
-        <a:fontRef idx="minor">
-          <a:schemeClr val="lt1"/>
-        </a:fontRef>
-      </dsp:style>
-      <dsp:txBody>
-        <a:bodyPr spcFirstLastPara="0" vert="horz" wrap="square" lIns="52007" tIns="34671" rIns="17336" bIns="34671" numCol="1" spcCol="1270" anchor="ctr" anchorCtr="0">
-          <a:noAutofit/>
-        </a:bodyPr>
-        <a:lstStyle/>
-        <a:p>
-          <a:pPr marL="0" lvl="0" indent="0" algn="ctr" defTabSz="577850">
-            <a:lnSpc>
-              <a:spcPct val="90000"/>
-            </a:lnSpc>
-            <a:spcBef>
-              <a:spcPct val="0"/>
-            </a:spcBef>
-            <a:spcAft>
-              <a:spcPct val="35000"/>
-            </a:spcAft>
-            <a:buNone/>
-          </a:pPr>
-          <a:r>
-            <a:rPr lang="en-US" sz="1300" kern="1200" dirty="0"/>
+            <a:rPr lang="en-US" sz="1600" kern="1200" dirty="0"/>
             <a:t>If it’s unfamiliar with customer’s term, it calls nearest store</a:t>
           </a:r>
         </a:p>
       </dsp:txBody>
       <dsp:txXfrm>
-        <a:off x="8985174" y="1553557"/>
-        <a:ext cx="1375797" cy="917197"/>
+        <a:off x="8606880" y="1460569"/>
+        <a:ext cx="1654760" cy="1103173"/>
       </dsp:txXfrm>
     </dsp:sp>
   </dsp:spTree>
@@ -8626,7 +8496,7 @@
           <p:cNvPr id="2" name="Title 1">
             <a:extLst>
               <a:ext uri="{FF2B5EF4-FFF2-40B4-BE49-F238E27FC236}">
-                <a16:creationId xmlns:a16="http://schemas.microsoft.com/office/drawing/2014/main" id="{C13D231D-0EA7-4D15-A237-B2D716CAC70B}"/>
+                <a16:creationId xmlns:a16="http://schemas.microsoft.com/office/drawing/2014/main" id="{68833D1F-9285-4DBA-8A2D-FC996BF231DD}"/>
               </a:ext>
             </a:extLst>
           </p:cNvPr>
@@ -8644,7 +8514,7 @@
           <a:p>
             <a:r>
               <a:rPr lang="en-US" dirty="0"/>
-              <a:t>The problem</a:t>
+              <a:t>The solution</a:t>
             </a:r>
           </a:p>
         </p:txBody>
@@ -8654,7 +8524,7 @@
           <p:cNvPr id="3" name="Content Placeholder 2">
             <a:extLst>
               <a:ext uri="{FF2B5EF4-FFF2-40B4-BE49-F238E27FC236}">
-                <a16:creationId xmlns:a16="http://schemas.microsoft.com/office/drawing/2014/main" id="{E7B19815-12E5-4D63-9E77-FC5E5888AFDA}"/>
+                <a16:creationId xmlns:a16="http://schemas.microsoft.com/office/drawing/2014/main" id="{8819B53D-08E8-4EE1-90A5-EB6F0F294C9D}"/>
               </a:ext>
             </a:extLst>
           </p:cNvPr>
@@ -8672,43 +8542,21 @@
           <a:p>
             <a:r>
               <a:rPr lang="en-US" dirty="0"/>
-              <a:t>When I switched to </a:t>
-            </a:r>
-            <a:r>
-              <a:rPr lang="en-US" dirty="0" err="1"/>
-              <a:t>T-mobile</a:t>
-            </a:r>
+              <a:t>We created a chat bot that is capable of answering all of the customer’s questions based off their location</a:t>
+            </a:r>
+          </a:p>
+          <a:p>
             <a:r>
               <a:rPr lang="en-US" dirty="0"/>
-              <a:t>, I had to go and get a new </a:t>
-            </a:r>
-            <a:r>
-              <a:rPr lang="en-US" dirty="0" err="1"/>
-              <a:t>simcard</a:t>
-            </a:r>
-            <a:endParaRPr lang="en-US" dirty="0"/>
-          </a:p>
-          <a:p>
-            <a:r>
-              <a:rPr lang="en-US" dirty="0"/>
-              <a:t>The employee was very busy on the phone answering a customer’s stocking questions</a:t>
-            </a:r>
-          </a:p>
-          <a:p>
-            <a:r>
-              <a:rPr lang="en-US" dirty="0"/>
-              <a:t>It took me 45 minutes to do a 5 minute process because of this phone call</a:t>
-            </a:r>
-          </a:p>
-          <a:p>
-            <a:endParaRPr lang="en-US" dirty="0"/>
+              <a:t>This solution allows store employees to maintain focus on in-store customers rather than answering phone calls when unnecessary</a:t>
+            </a:r>
           </a:p>
         </p:txBody>
       </p:sp>
     </p:spTree>
     <p:extLst>
       <p:ext uri="{BB962C8B-B14F-4D97-AF65-F5344CB8AC3E}">
-        <p14:creationId xmlns:p14="http://schemas.microsoft.com/office/powerpoint/2010/main" val="1018753012"/>
+        <p14:creationId xmlns:p14="http://schemas.microsoft.com/office/powerpoint/2010/main" val="2645822141"/>
       </p:ext>
     </p:extLst>
   </p:cSld>
@@ -8740,7 +8588,7 @@
           <p:cNvPr id="2" name="Title 1">
             <a:extLst>
               <a:ext uri="{FF2B5EF4-FFF2-40B4-BE49-F238E27FC236}">
-                <a16:creationId xmlns:a16="http://schemas.microsoft.com/office/drawing/2014/main" id="{68833D1F-9285-4DBA-8A2D-FC996BF231DD}"/>
+                <a16:creationId xmlns:a16="http://schemas.microsoft.com/office/drawing/2014/main" id="{D57CC69D-C58E-401B-A077-935770848F60}"/>
               </a:ext>
             </a:extLst>
           </p:cNvPr>
@@ -8758,49 +8606,46 @@
           <a:p>
             <a:r>
               <a:rPr lang="en-US" dirty="0"/>
-              <a:t>The solution</a:t>
-            </a:r>
-          </a:p>
-        </p:txBody>
-      </p:sp>
-      <p:sp>
-        <p:nvSpPr>
-          <p:cNvPr id="3" name="Content Placeholder 2">
+              <a:t>The backend</a:t>
+            </a:r>
+          </a:p>
+        </p:txBody>
+      </p:sp>
+      <p:graphicFrame>
+        <p:nvGraphicFramePr>
+          <p:cNvPr id="6" name="Content Placeholder 5">
             <a:extLst>
               <a:ext uri="{FF2B5EF4-FFF2-40B4-BE49-F238E27FC236}">
-                <a16:creationId xmlns:a16="http://schemas.microsoft.com/office/drawing/2014/main" id="{8819B53D-08E8-4EE1-90A5-EB6F0F294C9D}"/>
+                <a16:creationId xmlns:a16="http://schemas.microsoft.com/office/drawing/2014/main" id="{C18C5F62-4BE8-4F58-85E3-B782DF73BF54}"/>
               </a:ext>
             </a:extLst>
           </p:cNvPr>
-          <p:cNvSpPr>
-            <a:spLocks noGrp="1"/>
-          </p:cNvSpPr>
+          <p:cNvGraphicFramePr>
+            <a:graphicFrameLocks noGrp="1"/>
+          </p:cNvGraphicFramePr>
           <p:nvPr>
             <p:ph idx="1"/>
-          </p:nvPr>
-        </p:nvSpPr>
-        <p:spPr/>
-        <p:txBody>
-          <a:bodyPr/>
-          <a:lstStyle/>
-          <a:p>
-            <a:r>
-              <a:rPr lang="en-US" dirty="0"/>
-              <a:t>We created a chat bot that is capable of answering all of the customer’s questions based off their location</a:t>
-            </a:r>
-          </a:p>
-          <a:p>
-            <a:r>
-              <a:rPr lang="en-US" dirty="0"/>
-              <a:t>This solution allows store employees to maintain focus on in-store customers rather than answering phone calls when unnecessary</a:t>
-            </a:r>
-          </a:p>
-        </p:txBody>
-      </p:sp>
+            <p:extLst>
+              <p:ext uri="{D42A27DB-BD31-4B8C-83A1-F6EECF244321}">
+                <p14:modId xmlns:p14="http://schemas.microsoft.com/office/powerpoint/2010/main" val="3139318271"/>
+              </p:ext>
+            </p:extLst>
+          </p:nvPr>
+        </p:nvGraphicFramePr>
+        <p:xfrm>
+          <a:off x="685800" y="2193925"/>
+          <a:ext cx="10820400" cy="4024313"/>
+        </p:xfrm>
+        <a:graphic>
+          <a:graphicData uri="http://schemas.openxmlformats.org/drawingml/2006/diagram">
+            <dgm:relIds xmlns:dgm="http://schemas.openxmlformats.org/drawingml/2006/diagram" xmlns:r="http://schemas.openxmlformats.org/officeDocument/2006/relationships" r:dm="rId2" r:lo="rId3" r:qs="rId4" r:cs="rId5"/>
+          </a:graphicData>
+        </a:graphic>
+      </p:graphicFrame>
     </p:spTree>
     <p:extLst>
       <p:ext uri="{BB962C8B-B14F-4D97-AF65-F5344CB8AC3E}">
-        <p14:creationId xmlns:p14="http://schemas.microsoft.com/office/powerpoint/2010/main" val="2645822141"/>
+        <p14:creationId xmlns:p14="http://schemas.microsoft.com/office/powerpoint/2010/main" val="2120202288"/>
       </p:ext>
     </p:extLst>
   </p:cSld>
@@ -8832,7 +8677,7 @@
           <p:cNvPr id="2" name="Title 1">
             <a:extLst>
               <a:ext uri="{FF2B5EF4-FFF2-40B4-BE49-F238E27FC236}">
-                <a16:creationId xmlns:a16="http://schemas.microsoft.com/office/drawing/2014/main" id="{D57CC69D-C58E-401B-A077-935770848F60}"/>
+                <a16:creationId xmlns:a16="http://schemas.microsoft.com/office/drawing/2014/main" id="{BE1A8609-3BAF-4882-B9B4-36FFA8789F05}"/>
               </a:ext>
             </a:extLst>
           </p:cNvPr>
@@ -8850,46 +8695,84 @@
           <a:p>
             <a:r>
               <a:rPr lang="en-US" dirty="0"/>
-              <a:t>The backend</a:t>
-            </a:r>
-          </a:p>
-        </p:txBody>
-      </p:sp>
-      <p:graphicFrame>
-        <p:nvGraphicFramePr>
-          <p:cNvPr id="6" name="Content Placeholder 5">
+              <a:t>The Data</a:t>
+            </a:r>
+          </a:p>
+        </p:txBody>
+      </p:sp>
+      <p:sp>
+        <p:nvSpPr>
+          <p:cNvPr id="3" name="Content Placeholder 2">
             <a:extLst>
               <a:ext uri="{FF2B5EF4-FFF2-40B4-BE49-F238E27FC236}">
-                <a16:creationId xmlns:a16="http://schemas.microsoft.com/office/drawing/2014/main" id="{C18C5F62-4BE8-4F58-85E3-B782DF73BF54}"/>
+                <a16:creationId xmlns:a16="http://schemas.microsoft.com/office/drawing/2014/main" id="{BA30F5B3-4562-434B-96B7-4A70233D93C5}"/>
               </a:ext>
             </a:extLst>
           </p:cNvPr>
-          <p:cNvGraphicFramePr>
-            <a:graphicFrameLocks noGrp="1"/>
-          </p:cNvGraphicFramePr>
+          <p:cNvSpPr>
+            <a:spLocks noGrp="1"/>
+          </p:cNvSpPr>
           <p:nvPr>
             <p:ph idx="1"/>
-            <p:extLst>
-              <p:ext uri="{D42A27DB-BD31-4B8C-83A1-F6EECF244321}">
-                <p14:modId xmlns:p14="http://schemas.microsoft.com/office/powerpoint/2010/main" val="1114813009"/>
-              </p:ext>
-            </p:extLst>
-          </p:nvPr>
-        </p:nvGraphicFramePr>
-        <p:xfrm>
-          <a:off x="685800" y="2193925"/>
-          <a:ext cx="10820400" cy="4024313"/>
-        </p:xfrm>
-        <a:graphic>
-          <a:graphicData uri="http://schemas.openxmlformats.org/drawingml/2006/diagram">
-            <dgm:relIds xmlns:dgm="http://schemas.openxmlformats.org/drawingml/2006/diagram" xmlns:r="http://schemas.openxmlformats.org/officeDocument/2006/relationships" r:dm="rId2" r:lo="rId3" r:qs="rId4" r:cs="rId5"/>
-          </a:graphicData>
-        </a:graphic>
-      </p:graphicFrame>
+          </p:nvPr>
+        </p:nvSpPr>
+        <p:spPr>
+          <a:xfrm>
+            <a:off x="685800" y="2194560"/>
+            <a:ext cx="10820400" cy="4024125"/>
+          </a:xfrm>
+        </p:spPr>
+        <p:txBody>
+          <a:bodyPr/>
+          <a:lstStyle/>
+          <a:p>
+            <a:r>
+              <a:rPr lang="en-US" dirty="0"/>
+              <a:t>We went to </a:t>
+            </a:r>
+            <a:r>
+              <a:rPr lang="en-US" dirty="0" err="1"/>
+              <a:t>T-mobile</a:t>
+            </a:r>
+            <a:r>
+              <a:rPr lang="en-US" dirty="0"/>
+              <a:t> stores around Atlanta asking them some basic data about their call data.</a:t>
+            </a:r>
+          </a:p>
+          <a:p>
+            <a:pPr lvl="1"/>
+            <a:r>
+              <a:rPr lang="en-US" dirty="0"/>
+              <a:t>The stores we went to said:</a:t>
+            </a:r>
+          </a:p>
+          <a:p>
+            <a:pPr lvl="2"/>
+            <a:r>
+              <a:rPr lang="en-US" dirty="0"/>
+              <a:t>5-30 people call daily</a:t>
+            </a:r>
+          </a:p>
+          <a:p>
+            <a:pPr lvl="2"/>
+            <a:r>
+              <a:rPr lang="en-US" dirty="0"/>
+              <a:t>They usually call about Inventory, Bill Payment, and deals in store</a:t>
+            </a:r>
+          </a:p>
+          <a:p>
+            <a:pPr lvl="2"/>
+            <a:r>
+              <a:rPr lang="en-US" dirty="0"/>
+              <a:t>The calls last from 5 seconds to ~10 minutes depending on the requests asked</a:t>
+            </a:r>
+          </a:p>
+        </p:txBody>
+      </p:sp>
     </p:spTree>
     <p:extLst>
       <p:ext uri="{BB962C8B-B14F-4D97-AF65-F5344CB8AC3E}">
-        <p14:creationId xmlns:p14="http://schemas.microsoft.com/office/powerpoint/2010/main" val="2120202288"/>
+        <p14:creationId xmlns:p14="http://schemas.microsoft.com/office/powerpoint/2010/main" val="1473288992"/>
       </p:ext>
     </p:extLst>
   </p:cSld>
@@ -8921,133 +8804,6 @@
           <p:cNvPr id="2" name="Title 1">
             <a:extLst>
               <a:ext uri="{FF2B5EF4-FFF2-40B4-BE49-F238E27FC236}">
-                <a16:creationId xmlns:a16="http://schemas.microsoft.com/office/drawing/2014/main" id="{BE1A8609-3BAF-4882-B9B4-36FFA8789F05}"/>
-              </a:ext>
-            </a:extLst>
-          </p:cNvPr>
-          <p:cNvSpPr>
-            <a:spLocks noGrp="1"/>
-          </p:cNvSpPr>
-          <p:nvPr>
-            <p:ph type="title"/>
-          </p:nvPr>
-        </p:nvSpPr>
-        <p:spPr/>
-        <p:txBody>
-          <a:bodyPr/>
-          <a:lstStyle/>
-          <a:p>
-            <a:r>
-              <a:rPr lang="en-US" dirty="0"/>
-              <a:t>The Data</a:t>
-            </a:r>
-          </a:p>
-        </p:txBody>
-      </p:sp>
-      <p:sp>
-        <p:nvSpPr>
-          <p:cNvPr id="3" name="Content Placeholder 2">
-            <a:extLst>
-              <a:ext uri="{FF2B5EF4-FFF2-40B4-BE49-F238E27FC236}">
-                <a16:creationId xmlns:a16="http://schemas.microsoft.com/office/drawing/2014/main" id="{BA30F5B3-4562-434B-96B7-4A70233D93C5}"/>
-              </a:ext>
-            </a:extLst>
-          </p:cNvPr>
-          <p:cNvSpPr>
-            <a:spLocks noGrp="1"/>
-          </p:cNvSpPr>
-          <p:nvPr>
-            <p:ph idx="1"/>
-          </p:nvPr>
-        </p:nvSpPr>
-        <p:spPr>
-          <a:xfrm>
-            <a:off x="685800" y="2194560"/>
-            <a:ext cx="10820400" cy="4024125"/>
-          </a:xfrm>
-        </p:spPr>
-        <p:txBody>
-          <a:bodyPr/>
-          <a:lstStyle/>
-          <a:p>
-            <a:r>
-              <a:rPr lang="en-US" dirty="0"/>
-              <a:t>We went to </a:t>
-            </a:r>
-            <a:r>
-              <a:rPr lang="en-US" dirty="0" err="1"/>
-              <a:t>T-mobile</a:t>
-            </a:r>
-            <a:r>
-              <a:rPr lang="en-US" dirty="0"/>
-              <a:t> stores around Atlanta asking them some basic data about their call data.</a:t>
-            </a:r>
-          </a:p>
-          <a:p>
-            <a:pPr lvl="1"/>
-            <a:r>
-              <a:rPr lang="en-US" dirty="0"/>
-              <a:t>The stores we went to said:</a:t>
-            </a:r>
-          </a:p>
-          <a:p>
-            <a:pPr lvl="2"/>
-            <a:r>
-              <a:rPr lang="en-US" dirty="0"/>
-              <a:t>5-30 people call daily</a:t>
-            </a:r>
-          </a:p>
-          <a:p>
-            <a:pPr lvl="2"/>
-            <a:r>
-              <a:rPr lang="en-US" dirty="0"/>
-              <a:t>They usually call about Inventory, Bill Payment, and deals in store</a:t>
-            </a:r>
-          </a:p>
-          <a:p>
-            <a:pPr lvl="2"/>
-            <a:r>
-              <a:rPr lang="en-US" dirty="0"/>
-              <a:t>The calls last from 5 seconds to ~10 minutes depending on the requests asked</a:t>
-            </a:r>
-          </a:p>
-        </p:txBody>
-      </p:sp>
-    </p:spTree>
-    <p:extLst>
-      <p:ext uri="{BB962C8B-B14F-4D97-AF65-F5344CB8AC3E}">
-        <p14:creationId xmlns:p14="http://schemas.microsoft.com/office/powerpoint/2010/main" val="1473288992"/>
-      </p:ext>
-    </p:extLst>
-  </p:cSld>
-  <p:clrMapOvr>
-    <a:masterClrMapping/>
-  </p:clrMapOvr>
-</p:sld>
-</file>
-
-<file path=ppt/slides/slide6.xml><?xml version="1.0" encoding="utf-8"?>
-<p:sld xmlns:a="http://schemas.openxmlformats.org/drawingml/2006/main" xmlns:r="http://schemas.openxmlformats.org/officeDocument/2006/relationships" xmlns:p="http://schemas.openxmlformats.org/presentationml/2006/main">
-  <p:cSld>
-    <p:spTree>
-      <p:nvGrpSpPr>
-        <p:cNvPr id="1" name=""/>
-        <p:cNvGrpSpPr/>
-        <p:nvPr/>
-      </p:nvGrpSpPr>
-      <p:grpSpPr>
-        <a:xfrm>
-          <a:off x="0" y="0"/>
-          <a:ext cx="0" cy="0"/>
-          <a:chOff x="0" y="0"/>
-          <a:chExt cx="0" cy="0"/>
-        </a:xfrm>
-      </p:grpSpPr>
-      <p:sp>
-        <p:nvSpPr>
-          <p:cNvPr id="2" name="Title 1">
-            <a:extLst>
-              <a:ext uri="{FF2B5EF4-FFF2-40B4-BE49-F238E27FC236}">
                 <a16:creationId xmlns:a16="http://schemas.microsoft.com/office/drawing/2014/main" id="{A8752706-0FB4-455B-B201-3131DDD38ED1}"/>
               </a:ext>
             </a:extLst>
@@ -9124,6 +8880,21 @@
               <a:rPr lang="en-US" dirty="0"/>
               <a:t>What time do you guys close tomorrow?</a:t>
             </a:r>
+          </a:p>
+          <a:p>
+            <a:pPr lvl="2"/>
+            <a:endParaRPr lang="en-US" dirty="0"/>
+          </a:p>
+          <a:p>
+            <a:r>
+              <a:rPr lang="en-US" dirty="0"/>
+              <a:t>In </a:t>
+            </a:r>
+            <a:r>
+              <a:rPr lang="en-US"/>
+              <a:t>many situations it took as many as 3 minutes to get this info.</a:t>
+            </a:r>
+            <a:endParaRPr lang="en-US" dirty="0"/>
           </a:p>
           <a:p>
             <a:endParaRPr lang="en-US" dirty="0"/>
@@ -9174,7 +8945,7 @@
 </p:sld>
 </file>
 
-<file path=ppt/slides/slide7.xml><?xml version="1.0" encoding="utf-8"?>
+<file path=ppt/slides/slide6.xml><?xml version="1.0" encoding="utf-8"?>
 <p:sld xmlns:a="http://schemas.openxmlformats.org/drawingml/2006/main" xmlns:r="http://schemas.openxmlformats.org/officeDocument/2006/relationships" xmlns:p="http://schemas.openxmlformats.org/presentationml/2006/main">
   <p:cSld>
     <p:spTree>

</xml_diff>